<commit_message>
add initial server [WIP]
</commit_message>
<xml_diff>
--- a/images/design.pptx
+++ b/images/design.pptx
@@ -104,6 +104,11 @@
       </a:defRPr>
     </a:lvl9pPr>
   </p:defaultTextStyle>
+  <p:extLst>
+    <p:ext uri="{EFAFB233-063F-42B5-8137-9DF3F51BA10A}">
+      <p15:sldGuideLst xmlns:p15="http://schemas.microsoft.com/office/powerpoint/2012/main"/>
+    </p:ext>
+  </p:extLst>
 </p:presentation>
 </file>
 
@@ -238,7 +243,7 @@
           <a:p>
             <a:fld id="{D5B1543A-C7B2-4092-A2CF-5D3DD9A38739}" type="datetimeFigureOut">
               <a:rPr kumimoji="1" lang="ja-JP" altLang="en-US" smtClean="0"/>
-              <a:t>2015/9/29</a:t>
+              <a:t>2015/10/27</a:t>
             </a:fld>
             <a:endParaRPr kumimoji="1" lang="ja-JP" altLang="en-US"/>
           </a:p>
@@ -440,7 +445,7 @@
           <a:p>
             <a:fld id="{D5B1543A-C7B2-4092-A2CF-5D3DD9A38739}" type="datetimeFigureOut">
               <a:rPr kumimoji="1" lang="ja-JP" altLang="en-US" smtClean="0"/>
-              <a:t>2015/9/29</a:t>
+              <a:t>2015/10/27</a:t>
             </a:fld>
             <a:endParaRPr kumimoji="1" lang="ja-JP" altLang="en-US"/>
           </a:p>
@@ -652,7 +657,7 @@
           <a:p>
             <a:fld id="{D5B1543A-C7B2-4092-A2CF-5D3DD9A38739}" type="datetimeFigureOut">
               <a:rPr kumimoji="1" lang="ja-JP" altLang="en-US" smtClean="0"/>
-              <a:t>2015/9/29</a:t>
+              <a:t>2015/10/27</a:t>
             </a:fld>
             <a:endParaRPr kumimoji="1" lang="ja-JP" altLang="en-US"/>
           </a:p>
@@ -854,7 +859,7 @@
           <a:p>
             <a:fld id="{D5B1543A-C7B2-4092-A2CF-5D3DD9A38739}" type="datetimeFigureOut">
               <a:rPr kumimoji="1" lang="ja-JP" altLang="en-US" smtClean="0"/>
-              <a:t>2015/9/29</a:t>
+              <a:t>2015/10/27</a:t>
             </a:fld>
             <a:endParaRPr kumimoji="1" lang="ja-JP" altLang="en-US"/>
           </a:p>
@@ -1098,7 +1103,7 @@
           <a:p>
             <a:fld id="{D5B1543A-C7B2-4092-A2CF-5D3DD9A38739}" type="datetimeFigureOut">
               <a:rPr kumimoji="1" lang="ja-JP" altLang="en-US" smtClean="0"/>
-              <a:t>2015/9/29</a:t>
+              <a:t>2015/10/27</a:t>
             </a:fld>
             <a:endParaRPr kumimoji="1" lang="ja-JP" altLang="en-US"/>
           </a:p>
@@ -1394,7 +1399,7 @@
           <a:p>
             <a:fld id="{D5B1543A-C7B2-4092-A2CF-5D3DD9A38739}" type="datetimeFigureOut">
               <a:rPr kumimoji="1" lang="ja-JP" altLang="en-US" smtClean="0"/>
-              <a:t>2015/9/29</a:t>
+              <a:t>2015/10/27</a:t>
             </a:fld>
             <a:endParaRPr kumimoji="1" lang="ja-JP" altLang="en-US"/>
           </a:p>
@@ -1825,7 +1830,7 @@
           <a:p>
             <a:fld id="{D5B1543A-C7B2-4092-A2CF-5D3DD9A38739}" type="datetimeFigureOut">
               <a:rPr kumimoji="1" lang="ja-JP" altLang="en-US" smtClean="0"/>
-              <a:t>2015/9/29</a:t>
+              <a:t>2015/10/27</a:t>
             </a:fld>
             <a:endParaRPr kumimoji="1" lang="ja-JP" altLang="en-US"/>
           </a:p>
@@ -1943,7 +1948,7 @@
           <a:p>
             <a:fld id="{D5B1543A-C7B2-4092-A2CF-5D3DD9A38739}" type="datetimeFigureOut">
               <a:rPr kumimoji="1" lang="ja-JP" altLang="en-US" smtClean="0"/>
-              <a:t>2015/9/29</a:t>
+              <a:t>2015/10/27</a:t>
             </a:fld>
             <a:endParaRPr kumimoji="1" lang="ja-JP" altLang="en-US"/>
           </a:p>
@@ -2038,7 +2043,7 @@
           <a:p>
             <a:fld id="{D5B1543A-C7B2-4092-A2CF-5D3DD9A38739}" type="datetimeFigureOut">
               <a:rPr kumimoji="1" lang="ja-JP" altLang="en-US" smtClean="0"/>
-              <a:t>2015/9/29</a:t>
+              <a:t>2015/10/27</a:t>
             </a:fld>
             <a:endParaRPr kumimoji="1" lang="ja-JP" altLang="en-US"/>
           </a:p>
@@ -2347,7 +2352,7 @@
           <a:p>
             <a:fld id="{D5B1543A-C7B2-4092-A2CF-5D3DD9A38739}" type="datetimeFigureOut">
               <a:rPr kumimoji="1" lang="ja-JP" altLang="en-US" smtClean="0"/>
-              <a:t>2015/9/29</a:t>
+              <a:t>2015/10/27</a:t>
             </a:fld>
             <a:endParaRPr kumimoji="1" lang="ja-JP" altLang="en-US"/>
           </a:p>
@@ -2604,7 +2609,7 @@
           <a:p>
             <a:fld id="{D5B1543A-C7B2-4092-A2CF-5D3DD9A38739}" type="datetimeFigureOut">
               <a:rPr kumimoji="1" lang="ja-JP" altLang="en-US" smtClean="0"/>
-              <a:t>2015/9/29</a:t>
+              <a:t>2015/10/27</a:t>
             </a:fld>
             <a:endParaRPr kumimoji="1" lang="ja-JP" altLang="en-US"/>
           </a:p>
@@ -2849,7 +2854,7 @@
           <a:p>
             <a:fld id="{D5B1543A-C7B2-4092-A2CF-5D3DD9A38739}" type="datetimeFigureOut">
               <a:rPr kumimoji="1" lang="ja-JP" altLang="en-US" smtClean="0"/>
-              <a:t>2015/9/29</a:t>
+              <a:t>2015/10/27</a:t>
             </a:fld>
             <a:endParaRPr kumimoji="1" lang="ja-JP" altLang="en-US"/>
           </a:p>
@@ -3731,7 +3736,11 @@
           <a:p>
             <a:r>
               <a:rPr kumimoji="1" lang="en-US" altLang="ja-JP" dirty="0" smtClean="0"/>
-              <a:t>POST /channels</a:t>
+              <a:t>GET </a:t>
+            </a:r>
+            <a:r>
+              <a:rPr kumimoji="1" lang="en-US" altLang="ja-JP" dirty="0" smtClean="0"/>
+              <a:t>/channels</a:t>
             </a:r>
           </a:p>
           <a:p>

</xml_diff>